<commit_message>
MAJ 28/03/2018 Signed-off-by: DrBlaf <chauveau.aurelien.76@gmail.com>
</commit_message>
<xml_diff>
--- a/poster/poster.pptx
+++ b/poster/poster.pptx
@@ -2,7 +2,7 @@
 <file path=ppt/presentation.xml><?xml version="1.0" encoding="utf-8"?>
 <p:presentation xmlns:a="http://schemas.openxmlformats.org/drawingml/2006/main" xmlns:r="http://schemas.openxmlformats.org/officeDocument/2006/relationships" xmlns:p="http://schemas.openxmlformats.org/presentationml/2006/main" saveSubsetFonts="1">
   <p:sldMasterIdLst>
-    <p:sldMasterId id="2147483684" r:id="rId1"/>
+    <p:sldMasterId id="2147483720" r:id="rId1"/>
   </p:sldMasterIdLst>
   <p:sldIdLst>
     <p:sldId id="256" r:id="rId2"/>
@@ -13,7 +13,7 @@
     <a:defPPr>
       <a:defRPr lang="fr-FR"/>
     </a:defPPr>
-    <a:lvl1pPr marL="0" algn="l" defTabSz="4176431" rtl="0" eaLnBrk="1" latinLnBrk="0" hangingPunct="1">
+    <a:lvl1pPr marL="0" algn="l" defTabSz="4175613" rtl="0" eaLnBrk="1" latinLnBrk="0" hangingPunct="1">
       <a:defRPr sz="8200" kern="1200">
         <a:solidFill>
           <a:schemeClr val="tx1"/>
@@ -23,7 +23,7 @@
         <a:cs typeface="+mn-cs"/>
       </a:defRPr>
     </a:lvl1pPr>
-    <a:lvl2pPr marL="2088215" algn="l" defTabSz="4176431" rtl="0" eaLnBrk="1" latinLnBrk="0" hangingPunct="1">
+    <a:lvl2pPr marL="2087804" algn="l" defTabSz="4175613" rtl="0" eaLnBrk="1" latinLnBrk="0" hangingPunct="1">
       <a:defRPr sz="8200" kern="1200">
         <a:solidFill>
           <a:schemeClr val="tx1"/>
@@ -33,7 +33,7 @@
         <a:cs typeface="+mn-cs"/>
       </a:defRPr>
     </a:lvl2pPr>
-    <a:lvl3pPr marL="4176431" algn="l" defTabSz="4176431" rtl="0" eaLnBrk="1" latinLnBrk="0" hangingPunct="1">
+    <a:lvl3pPr marL="4175613" algn="l" defTabSz="4175613" rtl="0" eaLnBrk="1" latinLnBrk="0" hangingPunct="1">
       <a:defRPr sz="8200" kern="1200">
         <a:solidFill>
           <a:schemeClr val="tx1"/>
@@ -43,7 +43,7 @@
         <a:cs typeface="+mn-cs"/>
       </a:defRPr>
     </a:lvl3pPr>
-    <a:lvl4pPr marL="6264646" algn="l" defTabSz="4176431" rtl="0" eaLnBrk="1" latinLnBrk="0" hangingPunct="1">
+    <a:lvl4pPr marL="6263417" algn="l" defTabSz="4175613" rtl="0" eaLnBrk="1" latinLnBrk="0" hangingPunct="1">
       <a:defRPr sz="8200" kern="1200">
         <a:solidFill>
           <a:schemeClr val="tx1"/>
@@ -53,7 +53,7 @@
         <a:cs typeface="+mn-cs"/>
       </a:defRPr>
     </a:lvl4pPr>
-    <a:lvl5pPr marL="8352861" algn="l" defTabSz="4176431" rtl="0" eaLnBrk="1" latinLnBrk="0" hangingPunct="1">
+    <a:lvl5pPr marL="8351221" algn="l" defTabSz="4175613" rtl="0" eaLnBrk="1" latinLnBrk="0" hangingPunct="1">
       <a:defRPr sz="8200" kern="1200">
         <a:solidFill>
           <a:schemeClr val="tx1"/>
@@ -63,7 +63,7 @@
         <a:cs typeface="+mn-cs"/>
       </a:defRPr>
     </a:lvl5pPr>
-    <a:lvl6pPr marL="10441076" algn="l" defTabSz="4176431" rtl="0" eaLnBrk="1" latinLnBrk="0" hangingPunct="1">
+    <a:lvl6pPr marL="10439030" algn="l" defTabSz="4175613" rtl="0" eaLnBrk="1" latinLnBrk="0" hangingPunct="1">
       <a:defRPr sz="8200" kern="1200">
         <a:solidFill>
           <a:schemeClr val="tx1"/>
@@ -73,7 +73,7 @@
         <a:cs typeface="+mn-cs"/>
       </a:defRPr>
     </a:lvl6pPr>
-    <a:lvl7pPr marL="12529292" algn="l" defTabSz="4176431" rtl="0" eaLnBrk="1" latinLnBrk="0" hangingPunct="1">
+    <a:lvl7pPr marL="12526834" algn="l" defTabSz="4175613" rtl="0" eaLnBrk="1" latinLnBrk="0" hangingPunct="1">
       <a:defRPr sz="8200" kern="1200">
         <a:solidFill>
           <a:schemeClr val="tx1"/>
@@ -83,7 +83,7 @@
         <a:cs typeface="+mn-cs"/>
       </a:defRPr>
     </a:lvl7pPr>
-    <a:lvl8pPr marL="14617507" algn="l" defTabSz="4176431" rtl="0" eaLnBrk="1" latinLnBrk="0" hangingPunct="1">
+    <a:lvl8pPr marL="14614639" algn="l" defTabSz="4175613" rtl="0" eaLnBrk="1" latinLnBrk="0" hangingPunct="1">
       <a:defRPr sz="8200" kern="1200">
         <a:solidFill>
           <a:schemeClr val="tx1"/>
@@ -93,7 +93,7 @@
         <a:cs typeface="+mn-cs"/>
       </a:defRPr>
     </a:lvl8pPr>
-    <a:lvl9pPr marL="16705722" algn="l" defTabSz="4176431" rtl="0" eaLnBrk="1" latinLnBrk="0" hangingPunct="1">
+    <a:lvl9pPr marL="16702447" algn="l" defTabSz="4175613" rtl="0" eaLnBrk="1" latinLnBrk="0" hangingPunct="1">
       <a:defRPr sz="8200" kern="1200">
         <a:solidFill>
           <a:schemeClr val="tx1"/>
@@ -136,7 +136,7 @@
         </p:nvSpPr>
         <p:spPr>
           <a:xfrm>
-            <a:off x="2270998" y="13298392"/>
+            <a:off x="2270998" y="13298398"/>
             <a:ext cx="25737979" cy="9176087"/>
           </a:xfrm>
         </p:spPr>
@@ -181,7 +181,7 @@
                 </a:solidFill>
               </a:defRPr>
             </a:lvl1pPr>
-            <a:lvl2pPr marL="2088215" indent="0" algn="ctr">
+            <a:lvl2pPr marL="2087804" indent="0" algn="ctr">
               <a:buNone/>
               <a:defRPr>
                 <a:solidFill>
@@ -191,7 +191,7 @@
                 </a:solidFill>
               </a:defRPr>
             </a:lvl2pPr>
-            <a:lvl3pPr marL="4176431" indent="0" algn="ctr">
+            <a:lvl3pPr marL="4175613" indent="0" algn="ctr">
               <a:buNone/>
               <a:defRPr>
                 <a:solidFill>
@@ -201,7 +201,7 @@
                 </a:solidFill>
               </a:defRPr>
             </a:lvl3pPr>
-            <a:lvl4pPr marL="6264646" indent="0" algn="ctr">
+            <a:lvl4pPr marL="6263417" indent="0" algn="ctr">
               <a:buNone/>
               <a:defRPr>
                 <a:solidFill>
@@ -211,7 +211,7 @@
                 </a:solidFill>
               </a:defRPr>
             </a:lvl4pPr>
-            <a:lvl5pPr marL="8352861" indent="0" algn="ctr">
+            <a:lvl5pPr marL="8351221" indent="0" algn="ctr">
               <a:buNone/>
               <a:defRPr>
                 <a:solidFill>
@@ -221,7 +221,7 @@
                 </a:solidFill>
               </a:defRPr>
             </a:lvl5pPr>
-            <a:lvl6pPr marL="10441076" indent="0" algn="ctr">
+            <a:lvl6pPr marL="10439030" indent="0" algn="ctr">
               <a:buNone/>
               <a:defRPr>
                 <a:solidFill>
@@ -231,7 +231,7 @@
                 </a:solidFill>
               </a:defRPr>
             </a:lvl6pPr>
-            <a:lvl7pPr marL="12529292" indent="0" algn="ctr">
+            <a:lvl7pPr marL="12526834" indent="0" algn="ctr">
               <a:buNone/>
               <a:defRPr>
                 <a:solidFill>
@@ -241,7 +241,7 @@
                 </a:solidFill>
               </a:defRPr>
             </a:lvl7pPr>
-            <a:lvl8pPr marL="14617507" indent="0" algn="ctr">
+            <a:lvl8pPr marL="14614639" indent="0" algn="ctr">
               <a:buNone/>
               <a:defRPr>
                 <a:solidFill>
@@ -251,7 +251,7 @@
                 </a:solidFill>
               </a:defRPr>
             </a:lvl8pPr>
-            <a:lvl9pPr marL="16705722" indent="0" algn="ctr">
+            <a:lvl9pPr marL="16702447" indent="0" algn="ctr">
               <a:buNone/>
               <a:defRPr>
                 <a:solidFill>
@@ -289,7 +289,7 @@
             <a:fld id="{AA309A6D-C09C-4548-B29A-6CF363A7E532}" type="datetimeFigureOut">
               <a:rPr lang="fr-FR" smtClean="0"/>
               <a:pPr/>
-              <a:t>20/03/2018</a:t>
+              <a:t>26/03/2018</a:t>
             </a:fld>
             <a:endParaRPr lang="fr-BE"/>
           </a:p>
@@ -456,7 +456,7 @@
             <a:fld id="{AA309A6D-C09C-4548-B29A-6CF363A7E532}" type="datetimeFigureOut">
               <a:rPr lang="fr-FR" smtClean="0"/>
               <a:pPr/>
-              <a:t>20/03/2018</a:t>
+              <a:t>26/03/2018</a:t>
             </a:fld>
             <a:endParaRPr lang="fr-BE"/>
           </a:p>
@@ -542,7 +542,7 @@
         </p:nvSpPr>
         <p:spPr>
           <a:xfrm>
-            <a:off x="21952982" y="1714329"/>
+            <a:off x="21952982" y="1714335"/>
             <a:ext cx="6812994" cy="36525978"/>
           </a:xfrm>
         </p:spPr>
@@ -570,7 +570,7 @@
         </p:nvSpPr>
         <p:spPr>
           <a:xfrm>
-            <a:off x="1513999" y="1714329"/>
+            <a:off x="1513999" y="1714335"/>
             <a:ext cx="19934317" cy="36525978"/>
           </a:xfrm>
         </p:spPr>
@@ -633,7 +633,7 @@
             <a:fld id="{AA309A6D-C09C-4548-B29A-6CF363A7E532}" type="datetimeFigureOut">
               <a:rPr lang="fr-FR" smtClean="0"/>
               <a:pPr/>
-              <a:t>20/03/2018</a:t>
+              <a:t>26/03/2018</a:t>
             </a:fld>
             <a:endParaRPr lang="fr-BE"/>
           </a:p>
@@ -800,7 +800,7 @@
             <a:fld id="{AA309A6D-C09C-4548-B29A-6CF363A7E532}" type="datetimeFigureOut">
               <a:rPr lang="fr-FR" smtClean="0"/>
               <a:pPr/>
-              <a:t>20/03/2018</a:t>
+              <a:t>26/03/2018</a:t>
             </a:fld>
             <a:endParaRPr lang="fr-BE"/>
           </a:p>
@@ -886,7 +886,7 @@
         </p:nvSpPr>
         <p:spPr>
           <a:xfrm>
-            <a:off x="2391909" y="27508444"/>
+            <a:off x="2391909" y="27508450"/>
             <a:ext cx="25737979" cy="8502249"/>
           </a:xfrm>
         </p:spPr>
@@ -935,7 +935,7 @@
                 </a:solidFill>
               </a:defRPr>
             </a:lvl1pPr>
-            <a:lvl2pPr marL="2088215" indent="0">
+            <a:lvl2pPr marL="2087804" indent="0">
               <a:buNone/>
               <a:defRPr sz="8200">
                 <a:solidFill>
@@ -945,7 +945,7 @@
                 </a:solidFill>
               </a:defRPr>
             </a:lvl2pPr>
-            <a:lvl3pPr marL="4176431" indent="0">
+            <a:lvl3pPr marL="4175613" indent="0">
               <a:buNone/>
               <a:defRPr sz="7300">
                 <a:solidFill>
@@ -955,7 +955,7 @@
                 </a:solidFill>
               </a:defRPr>
             </a:lvl3pPr>
-            <a:lvl4pPr marL="6264646" indent="0">
+            <a:lvl4pPr marL="6263417" indent="0">
               <a:buNone/>
               <a:defRPr sz="6400">
                 <a:solidFill>
@@ -965,7 +965,7 @@
                 </a:solidFill>
               </a:defRPr>
             </a:lvl4pPr>
-            <a:lvl5pPr marL="8352861" indent="0">
+            <a:lvl5pPr marL="8351221" indent="0">
               <a:buNone/>
               <a:defRPr sz="6400">
                 <a:solidFill>
@@ -975,7 +975,7 @@
                 </a:solidFill>
               </a:defRPr>
             </a:lvl5pPr>
-            <a:lvl6pPr marL="10441076" indent="0">
+            <a:lvl6pPr marL="10439030" indent="0">
               <a:buNone/>
               <a:defRPr sz="6400">
                 <a:solidFill>
@@ -985,7 +985,7 @@
                 </a:solidFill>
               </a:defRPr>
             </a:lvl6pPr>
-            <a:lvl7pPr marL="12529292" indent="0">
+            <a:lvl7pPr marL="12526834" indent="0">
               <a:buNone/>
               <a:defRPr sz="6400">
                 <a:solidFill>
@@ -995,7 +995,7 @@
                 </a:solidFill>
               </a:defRPr>
             </a:lvl7pPr>
-            <a:lvl8pPr marL="14617507" indent="0">
+            <a:lvl8pPr marL="14614639" indent="0">
               <a:buNone/>
               <a:defRPr sz="6400">
                 <a:solidFill>
@@ -1005,7 +1005,7 @@
                 </a:solidFill>
               </a:defRPr>
             </a:lvl8pPr>
-            <a:lvl9pPr marL="16705722" indent="0">
+            <a:lvl9pPr marL="16702447" indent="0">
               <a:buNone/>
               <a:defRPr sz="6400">
                 <a:solidFill>
@@ -1043,7 +1043,7 @@
             <a:fld id="{AA309A6D-C09C-4548-B29A-6CF363A7E532}" type="datetimeFigureOut">
               <a:rPr lang="fr-FR" smtClean="0"/>
               <a:pPr/>
-              <a:t>20/03/2018</a:t>
+              <a:t>26/03/2018</a:t>
             </a:fld>
             <a:endParaRPr lang="fr-BE"/>
           </a:p>
@@ -1152,7 +1152,7 @@
         </p:nvSpPr>
         <p:spPr>
           <a:xfrm>
-            <a:off x="1513999" y="9988659"/>
+            <a:off x="1513999" y="9988665"/>
             <a:ext cx="13373656" cy="28251648"/>
           </a:xfrm>
         </p:spPr>
@@ -1237,7 +1237,7 @@
         </p:nvSpPr>
         <p:spPr>
           <a:xfrm>
-            <a:off x="15392320" y="9988659"/>
+            <a:off x="15392320" y="9988665"/>
             <a:ext cx="13373656" cy="28251648"/>
           </a:xfrm>
         </p:spPr>
@@ -1328,7 +1328,7 @@
             <a:fld id="{AA309A6D-C09C-4548-B29A-6CF363A7E532}" type="datetimeFigureOut">
               <a:rPr lang="fr-FR" smtClean="0"/>
               <a:pPr/>
-              <a:t>20/03/2018</a:t>
+              <a:t>26/03/2018</a:t>
             </a:fld>
             <a:endParaRPr lang="fr-BE"/>
           </a:p>
@@ -1452,35 +1452,35 @@
               <a:buNone/>
               <a:defRPr sz="11000" b="1"/>
             </a:lvl1pPr>
-            <a:lvl2pPr marL="2088215" indent="0">
+            <a:lvl2pPr marL="2087804" indent="0">
               <a:buNone/>
               <a:defRPr sz="9100" b="1"/>
             </a:lvl2pPr>
-            <a:lvl3pPr marL="4176431" indent="0">
+            <a:lvl3pPr marL="4175613" indent="0">
               <a:buNone/>
               <a:defRPr sz="8200" b="1"/>
             </a:lvl3pPr>
-            <a:lvl4pPr marL="6264646" indent="0">
+            <a:lvl4pPr marL="6263417" indent="0">
               <a:buNone/>
               <a:defRPr sz="7300" b="1"/>
             </a:lvl4pPr>
-            <a:lvl5pPr marL="8352861" indent="0">
+            <a:lvl5pPr marL="8351221" indent="0">
               <a:buNone/>
               <a:defRPr sz="7300" b="1"/>
             </a:lvl5pPr>
-            <a:lvl6pPr marL="10441076" indent="0">
+            <a:lvl6pPr marL="10439030" indent="0">
               <a:buNone/>
               <a:defRPr sz="7300" b="1"/>
             </a:lvl6pPr>
-            <a:lvl7pPr marL="12529292" indent="0">
+            <a:lvl7pPr marL="12526834" indent="0">
               <a:buNone/>
               <a:defRPr sz="7300" b="1"/>
             </a:lvl7pPr>
-            <a:lvl8pPr marL="14617507" indent="0">
+            <a:lvl8pPr marL="14614639" indent="0">
               <a:buNone/>
               <a:defRPr sz="7300" b="1"/>
             </a:lvl8pPr>
-            <a:lvl9pPr marL="16705722" indent="0">
+            <a:lvl9pPr marL="16702447" indent="0">
               <a:buNone/>
               <a:defRPr sz="7300" b="1"/>
             </a:lvl9pPr>
@@ -1602,35 +1602,35 @@
               <a:buNone/>
               <a:defRPr sz="11000" b="1"/>
             </a:lvl1pPr>
-            <a:lvl2pPr marL="2088215" indent="0">
+            <a:lvl2pPr marL="2087804" indent="0">
               <a:buNone/>
               <a:defRPr sz="9100" b="1"/>
             </a:lvl2pPr>
-            <a:lvl3pPr marL="4176431" indent="0">
+            <a:lvl3pPr marL="4175613" indent="0">
               <a:buNone/>
               <a:defRPr sz="8200" b="1"/>
             </a:lvl3pPr>
-            <a:lvl4pPr marL="6264646" indent="0">
+            <a:lvl4pPr marL="6263417" indent="0">
               <a:buNone/>
               <a:defRPr sz="7300" b="1"/>
             </a:lvl4pPr>
-            <a:lvl5pPr marL="8352861" indent="0">
+            <a:lvl5pPr marL="8351221" indent="0">
               <a:buNone/>
               <a:defRPr sz="7300" b="1"/>
             </a:lvl5pPr>
-            <a:lvl6pPr marL="10441076" indent="0">
+            <a:lvl6pPr marL="10439030" indent="0">
               <a:buNone/>
               <a:defRPr sz="7300" b="1"/>
             </a:lvl6pPr>
-            <a:lvl7pPr marL="12529292" indent="0">
+            <a:lvl7pPr marL="12526834" indent="0">
               <a:buNone/>
               <a:defRPr sz="7300" b="1"/>
             </a:lvl7pPr>
-            <a:lvl8pPr marL="14617507" indent="0">
+            <a:lvl8pPr marL="14614639" indent="0">
               <a:buNone/>
               <a:defRPr sz="7300" b="1"/>
             </a:lvl8pPr>
-            <a:lvl9pPr marL="16705722" indent="0">
+            <a:lvl9pPr marL="16702447" indent="0">
               <a:buNone/>
               <a:defRPr sz="7300" b="1"/>
             </a:lvl9pPr>
@@ -1747,7 +1747,7 @@
             <a:fld id="{AA309A6D-C09C-4548-B29A-6CF363A7E532}" type="datetimeFigureOut">
               <a:rPr lang="fr-FR" smtClean="0"/>
               <a:pPr/>
-              <a:t>20/03/2018</a:t>
+              <a:t>26/03/2018</a:t>
             </a:fld>
             <a:endParaRPr lang="fr-BE"/>
           </a:p>
@@ -1862,7 +1862,7 @@
             <a:fld id="{AA309A6D-C09C-4548-B29A-6CF363A7E532}" type="datetimeFigureOut">
               <a:rPr lang="fr-FR" smtClean="0"/>
               <a:pPr/>
-              <a:t>20/03/2018</a:t>
+              <a:t>26/03/2018</a:t>
             </a:fld>
             <a:endParaRPr lang="fr-BE"/>
           </a:p>
@@ -1954,7 +1954,7 @@
             <a:fld id="{AA309A6D-C09C-4548-B29A-6CF363A7E532}" type="datetimeFigureOut">
               <a:rPr lang="fr-FR" smtClean="0"/>
               <a:pPr/>
-              <a:t>20/03/2018</a:t>
+              <a:t>26/03/2018</a:t>
             </a:fld>
             <a:endParaRPr lang="fr-BE"/>
           </a:p>
@@ -2040,7 +2040,7 @@
         </p:nvSpPr>
         <p:spPr>
           <a:xfrm>
-            <a:off x="1514000" y="1704413"/>
+            <a:off x="1514004" y="1704413"/>
             <a:ext cx="9961903" cy="7253667"/>
           </a:xfrm>
         </p:spPr>
@@ -2072,7 +2072,7 @@
         </p:nvSpPr>
         <p:spPr>
           <a:xfrm>
-            <a:off x="11838629" y="1704417"/>
+            <a:off x="11838629" y="1704423"/>
             <a:ext cx="16927347" cy="36535890"/>
           </a:xfrm>
         </p:spPr>
@@ -2157,7 +2157,7 @@
         </p:nvSpPr>
         <p:spPr>
           <a:xfrm>
-            <a:off x="1514000" y="8958084"/>
+            <a:off x="1514004" y="8958090"/>
             <a:ext cx="9961903" cy="29282223"/>
           </a:xfrm>
         </p:spPr>
@@ -2168,35 +2168,35 @@
               <a:buNone/>
               <a:defRPr sz="6400"/>
             </a:lvl1pPr>
-            <a:lvl2pPr marL="2088215" indent="0">
+            <a:lvl2pPr marL="2087804" indent="0">
               <a:buNone/>
               <a:defRPr sz="5500"/>
             </a:lvl2pPr>
-            <a:lvl3pPr marL="4176431" indent="0">
+            <a:lvl3pPr marL="4175613" indent="0">
               <a:buNone/>
               <a:defRPr sz="4600"/>
             </a:lvl3pPr>
-            <a:lvl4pPr marL="6264646" indent="0">
+            <a:lvl4pPr marL="6263417" indent="0">
               <a:buNone/>
               <a:defRPr sz="4100"/>
             </a:lvl4pPr>
-            <a:lvl5pPr marL="8352861" indent="0">
+            <a:lvl5pPr marL="8351221" indent="0">
               <a:buNone/>
               <a:defRPr sz="4100"/>
             </a:lvl5pPr>
-            <a:lvl6pPr marL="10441076" indent="0">
+            <a:lvl6pPr marL="10439030" indent="0">
               <a:buNone/>
               <a:defRPr sz="4100"/>
             </a:lvl6pPr>
-            <a:lvl7pPr marL="12529292" indent="0">
+            <a:lvl7pPr marL="12526834" indent="0">
               <a:buNone/>
               <a:defRPr sz="4100"/>
             </a:lvl7pPr>
-            <a:lvl8pPr marL="14617507" indent="0">
+            <a:lvl8pPr marL="14614639" indent="0">
               <a:buNone/>
               <a:defRPr sz="4100"/>
             </a:lvl8pPr>
-            <a:lvl9pPr marL="16705722" indent="0">
+            <a:lvl9pPr marL="16702447" indent="0">
               <a:buNone/>
               <a:defRPr sz="4100"/>
             </a:lvl9pPr>
@@ -2228,7 +2228,7 @@
             <a:fld id="{AA309A6D-C09C-4548-B29A-6CF363A7E532}" type="datetimeFigureOut">
               <a:rPr lang="fr-FR" smtClean="0"/>
               <a:pPr/>
-              <a:t>20/03/2018</a:t>
+              <a:t>26/03/2018</a:t>
             </a:fld>
             <a:endParaRPr lang="fr-BE"/>
           </a:p>
@@ -2357,35 +2357,35 @@
               <a:buNone/>
               <a:defRPr sz="14600"/>
             </a:lvl1pPr>
-            <a:lvl2pPr marL="2088215" indent="0">
+            <a:lvl2pPr marL="2087804" indent="0">
               <a:buNone/>
               <a:defRPr sz="12800"/>
             </a:lvl2pPr>
-            <a:lvl3pPr marL="4176431" indent="0">
+            <a:lvl3pPr marL="4175613" indent="0">
               <a:buNone/>
               <a:defRPr sz="11000"/>
             </a:lvl3pPr>
-            <a:lvl4pPr marL="6264646" indent="0">
+            <a:lvl4pPr marL="6263417" indent="0">
               <a:buNone/>
               <a:defRPr sz="9100"/>
             </a:lvl4pPr>
-            <a:lvl5pPr marL="8352861" indent="0">
+            <a:lvl5pPr marL="8351221" indent="0">
               <a:buNone/>
               <a:defRPr sz="9100"/>
             </a:lvl5pPr>
-            <a:lvl6pPr marL="10441076" indent="0">
+            <a:lvl6pPr marL="10439030" indent="0">
               <a:buNone/>
               <a:defRPr sz="9100"/>
             </a:lvl6pPr>
-            <a:lvl7pPr marL="12529292" indent="0">
+            <a:lvl7pPr marL="12526834" indent="0">
               <a:buNone/>
               <a:defRPr sz="9100"/>
             </a:lvl7pPr>
-            <a:lvl8pPr marL="14617507" indent="0">
+            <a:lvl8pPr marL="14614639" indent="0">
               <a:buNone/>
               <a:defRPr sz="9100"/>
             </a:lvl8pPr>
-            <a:lvl9pPr marL="16705722" indent="0">
+            <a:lvl9pPr marL="16702447" indent="0">
               <a:buNone/>
               <a:defRPr sz="9100"/>
             </a:lvl9pPr>
@@ -2418,35 +2418,35 @@
               <a:buNone/>
               <a:defRPr sz="6400"/>
             </a:lvl1pPr>
-            <a:lvl2pPr marL="2088215" indent="0">
+            <a:lvl2pPr marL="2087804" indent="0">
               <a:buNone/>
               <a:defRPr sz="5500"/>
             </a:lvl2pPr>
-            <a:lvl3pPr marL="4176431" indent="0">
+            <a:lvl3pPr marL="4175613" indent="0">
               <a:buNone/>
               <a:defRPr sz="4600"/>
             </a:lvl3pPr>
-            <a:lvl4pPr marL="6264646" indent="0">
+            <a:lvl4pPr marL="6263417" indent="0">
               <a:buNone/>
               <a:defRPr sz="4100"/>
             </a:lvl4pPr>
-            <a:lvl5pPr marL="8352861" indent="0">
+            <a:lvl5pPr marL="8351221" indent="0">
               <a:buNone/>
               <a:defRPr sz="4100"/>
             </a:lvl5pPr>
-            <a:lvl6pPr marL="10441076" indent="0">
+            <a:lvl6pPr marL="10439030" indent="0">
               <a:buNone/>
               <a:defRPr sz="4100"/>
             </a:lvl6pPr>
-            <a:lvl7pPr marL="12529292" indent="0">
+            <a:lvl7pPr marL="12526834" indent="0">
               <a:buNone/>
               <a:defRPr sz="4100"/>
             </a:lvl7pPr>
-            <a:lvl8pPr marL="14617507" indent="0">
+            <a:lvl8pPr marL="14614639" indent="0">
               <a:buNone/>
               <a:defRPr sz="4100"/>
             </a:lvl8pPr>
-            <a:lvl9pPr marL="16705722" indent="0">
+            <a:lvl9pPr marL="16702447" indent="0">
               <a:buNone/>
               <a:defRPr sz="4100"/>
             </a:lvl9pPr>
@@ -2478,7 +2478,7 @@
             <a:fld id="{AA309A6D-C09C-4548-B29A-6CF363A7E532}" type="datetimeFigureOut">
               <a:rPr lang="fr-FR" smtClean="0"/>
               <a:pPr/>
-              <a:t>20/03/2018</a:t>
+              <a:t>26/03/2018</a:t>
             </a:fld>
             <a:endParaRPr lang="fr-BE"/>
           </a:p>
@@ -2539,9 +2539,12 @@
 <p:sldMaster xmlns:a="http://schemas.openxmlformats.org/drawingml/2006/main" xmlns:r="http://schemas.openxmlformats.org/officeDocument/2006/relationships" xmlns:p="http://schemas.openxmlformats.org/presentationml/2006/main">
   <p:cSld>
     <p:bg>
-      <p:bgRef idx="1001">
-        <a:schemeClr val="bg1"/>
-      </p:bgRef>
+      <p:bgPr>
+        <a:solidFill>
+          <a:schemeClr val="bg1"/>
+        </a:solidFill>
+        <a:effectLst/>
+      </p:bgPr>
     </p:bg>
     <p:spTree>
       <p:nvGrpSpPr>
@@ -2577,7 +2580,7 @@
           </a:prstGeom>
         </p:spPr>
         <p:txBody>
-          <a:bodyPr vert="horz" lIns="417643" tIns="208822" rIns="417643" bIns="208822" rtlCol="0" anchor="ctr">
+          <a:bodyPr vert="horz" lIns="417561" tIns="208780" rIns="417561" bIns="208780" rtlCol="0" anchor="ctr">
             <a:normAutofit/>
           </a:bodyPr>
           <a:lstStyle/>
@@ -2602,7 +2605,7 @@
         </p:nvSpPr>
         <p:spPr>
           <a:xfrm>
-            <a:off x="1513999" y="9988659"/>
+            <a:off x="1513999" y="9988665"/>
             <a:ext cx="27251978" cy="28251648"/>
           </a:xfrm>
           <a:prstGeom prst="rect">
@@ -2610,7 +2613,7 @@
           </a:prstGeom>
         </p:spPr>
         <p:txBody>
-          <a:bodyPr vert="horz" lIns="417643" tIns="208822" rIns="417643" bIns="208822" rtlCol="0">
+          <a:bodyPr vert="horz" lIns="417561" tIns="208780" rIns="417561" bIns="208780" rtlCol="0">
             <a:normAutofit/>
           </a:bodyPr>
           <a:lstStyle/>
@@ -2664,7 +2667,7 @@
         </p:nvSpPr>
         <p:spPr>
           <a:xfrm>
-            <a:off x="1513999" y="39677164"/>
+            <a:off x="1513999" y="39677170"/>
             <a:ext cx="7065328" cy="2279158"/>
           </a:xfrm>
           <a:prstGeom prst="rect">
@@ -2672,7 +2675,7 @@
           </a:prstGeom>
         </p:spPr>
         <p:txBody>
-          <a:bodyPr vert="horz" lIns="417643" tIns="208822" rIns="417643" bIns="208822" rtlCol="0" anchor="ctr"/>
+          <a:bodyPr vert="horz" lIns="417561" tIns="208780" rIns="417561" bIns="208780" rtlCol="0" anchor="ctr"/>
           <a:lstStyle>
             <a:lvl1pPr algn="l">
               <a:defRPr sz="5500">
@@ -2688,7 +2691,7 @@
             <a:fld id="{AA309A6D-C09C-4548-B29A-6CF363A7E532}" type="datetimeFigureOut">
               <a:rPr lang="fr-FR" smtClean="0"/>
               <a:pPr/>
-              <a:t>20/03/2018</a:t>
+              <a:t>26/03/2018</a:t>
             </a:fld>
             <a:endParaRPr lang="fr-BE"/>
           </a:p>
@@ -2706,7 +2709,7 @@
         </p:nvSpPr>
         <p:spPr>
           <a:xfrm>
-            <a:off x="10345658" y="39677164"/>
+            <a:off x="10345658" y="39677170"/>
             <a:ext cx="9588659" cy="2279158"/>
           </a:xfrm>
           <a:prstGeom prst="rect">
@@ -2714,7 +2717,7 @@
           </a:prstGeom>
         </p:spPr>
         <p:txBody>
-          <a:bodyPr vert="horz" lIns="417643" tIns="208822" rIns="417643" bIns="208822" rtlCol="0" anchor="ctr"/>
+          <a:bodyPr vert="horz" lIns="417561" tIns="208780" rIns="417561" bIns="208780" rtlCol="0" anchor="ctr"/>
           <a:lstStyle>
             <a:lvl1pPr algn="ctr">
               <a:defRPr sz="5500">
@@ -2743,7 +2746,7 @@
         </p:nvSpPr>
         <p:spPr>
           <a:xfrm>
-            <a:off x="21700649" y="39677164"/>
+            <a:off x="21700649" y="39677170"/>
             <a:ext cx="7065328" cy="2279158"/>
           </a:xfrm>
           <a:prstGeom prst="rect">
@@ -2751,7 +2754,7 @@
           </a:prstGeom>
         </p:spPr>
         <p:txBody>
-          <a:bodyPr vert="horz" lIns="417643" tIns="208822" rIns="417643" bIns="208822" rtlCol="0" anchor="ctr"/>
+          <a:bodyPr vert="horz" lIns="417561" tIns="208780" rIns="417561" bIns="208780" rtlCol="0" anchor="ctr"/>
           <a:lstStyle>
             <a:lvl1pPr algn="r">
               <a:defRPr sz="5500">
@@ -2777,21 +2780,21 @@
   </p:cSld>
   <p:clrMap bg1="lt1" tx1="dk1" bg2="lt2" tx2="dk2" accent1="accent1" accent2="accent2" accent3="accent3" accent4="accent4" accent5="accent5" accent6="accent6" hlink="hlink" folHlink="folHlink"/>
   <p:sldLayoutIdLst>
-    <p:sldLayoutId id="2147483685" r:id="rId1"/>
-    <p:sldLayoutId id="2147483686" r:id="rId2"/>
-    <p:sldLayoutId id="2147483687" r:id="rId3"/>
-    <p:sldLayoutId id="2147483688" r:id="rId4"/>
-    <p:sldLayoutId id="2147483689" r:id="rId5"/>
-    <p:sldLayoutId id="2147483690" r:id="rId6"/>
-    <p:sldLayoutId id="2147483691" r:id="rId7"/>
-    <p:sldLayoutId id="2147483692" r:id="rId8"/>
-    <p:sldLayoutId id="2147483693" r:id="rId9"/>
-    <p:sldLayoutId id="2147483694" r:id="rId10"/>
-    <p:sldLayoutId id="2147483695" r:id="rId11"/>
+    <p:sldLayoutId id="2147483721" r:id="rId1"/>
+    <p:sldLayoutId id="2147483722" r:id="rId2"/>
+    <p:sldLayoutId id="2147483723" r:id="rId3"/>
+    <p:sldLayoutId id="2147483724" r:id="rId4"/>
+    <p:sldLayoutId id="2147483725" r:id="rId5"/>
+    <p:sldLayoutId id="2147483726" r:id="rId6"/>
+    <p:sldLayoutId id="2147483727" r:id="rId7"/>
+    <p:sldLayoutId id="2147483728" r:id="rId8"/>
+    <p:sldLayoutId id="2147483729" r:id="rId9"/>
+    <p:sldLayoutId id="2147483730" r:id="rId10"/>
+    <p:sldLayoutId id="2147483731" r:id="rId11"/>
   </p:sldLayoutIdLst>
   <p:txStyles>
     <p:titleStyle>
-      <a:lvl1pPr algn="ctr" defTabSz="4176431" rtl="0" eaLnBrk="1" latinLnBrk="0" hangingPunct="1">
+      <a:lvl1pPr algn="ctr" defTabSz="4175613" rtl="0" eaLnBrk="1" latinLnBrk="0" hangingPunct="1">
         <a:spcBef>
           <a:spcPct val="0"/>
         </a:spcBef>
@@ -2807,7 +2810,7 @@
       </a:lvl1pPr>
     </p:titleStyle>
     <p:bodyStyle>
-      <a:lvl1pPr marL="1566161" indent="-1566161" algn="l" defTabSz="4176431" rtl="0" eaLnBrk="1" latinLnBrk="0" hangingPunct="1">
+      <a:lvl1pPr marL="1565855" indent="-1565855" algn="l" defTabSz="4175613" rtl="0" eaLnBrk="1" latinLnBrk="0" hangingPunct="1">
         <a:spcBef>
           <a:spcPct val="20000"/>
         </a:spcBef>
@@ -2822,7 +2825,7 @@
           <a:cs typeface="+mn-cs"/>
         </a:defRPr>
       </a:lvl1pPr>
-      <a:lvl2pPr marL="3393350" indent="-1305135" algn="l" defTabSz="4176431" rtl="0" eaLnBrk="1" latinLnBrk="0" hangingPunct="1">
+      <a:lvl2pPr marL="3392683" indent="-1304879" algn="l" defTabSz="4175613" rtl="0" eaLnBrk="1" latinLnBrk="0" hangingPunct="1">
         <a:spcBef>
           <a:spcPct val="20000"/>
         </a:spcBef>
@@ -2837,7 +2840,7 @@
           <a:cs typeface="+mn-cs"/>
         </a:defRPr>
       </a:lvl2pPr>
-      <a:lvl3pPr marL="5220538" indent="-1044108" algn="l" defTabSz="4176431" rtl="0" eaLnBrk="1" latinLnBrk="0" hangingPunct="1">
+      <a:lvl3pPr marL="5219515" indent="-1043902" algn="l" defTabSz="4175613" rtl="0" eaLnBrk="1" latinLnBrk="0" hangingPunct="1">
         <a:spcBef>
           <a:spcPct val="20000"/>
         </a:spcBef>
@@ -2852,7 +2855,7 @@
           <a:cs typeface="+mn-cs"/>
         </a:defRPr>
       </a:lvl3pPr>
-      <a:lvl4pPr marL="7308753" indent="-1044108" algn="l" defTabSz="4176431" rtl="0" eaLnBrk="1" latinLnBrk="0" hangingPunct="1">
+      <a:lvl4pPr marL="7307319" indent="-1043902" algn="l" defTabSz="4175613" rtl="0" eaLnBrk="1" latinLnBrk="0" hangingPunct="1">
         <a:spcBef>
           <a:spcPct val="20000"/>
         </a:spcBef>
@@ -2867,7 +2870,7 @@
           <a:cs typeface="+mn-cs"/>
         </a:defRPr>
       </a:lvl4pPr>
-      <a:lvl5pPr marL="9396969" indent="-1044108" algn="l" defTabSz="4176431" rtl="0" eaLnBrk="1" latinLnBrk="0" hangingPunct="1">
+      <a:lvl5pPr marL="9395128" indent="-1043902" algn="l" defTabSz="4175613" rtl="0" eaLnBrk="1" latinLnBrk="0" hangingPunct="1">
         <a:spcBef>
           <a:spcPct val="20000"/>
         </a:spcBef>
@@ -2882,7 +2885,7 @@
           <a:cs typeface="+mn-cs"/>
         </a:defRPr>
       </a:lvl5pPr>
-      <a:lvl6pPr marL="11485184" indent="-1044108" algn="l" defTabSz="4176431" rtl="0" eaLnBrk="1" latinLnBrk="0" hangingPunct="1">
+      <a:lvl6pPr marL="11482932" indent="-1043902" algn="l" defTabSz="4175613" rtl="0" eaLnBrk="1" latinLnBrk="0" hangingPunct="1">
         <a:spcBef>
           <a:spcPct val="20000"/>
         </a:spcBef>
@@ -2897,7 +2900,7 @@
           <a:cs typeface="+mn-cs"/>
         </a:defRPr>
       </a:lvl6pPr>
-      <a:lvl7pPr marL="13573399" indent="-1044108" algn="l" defTabSz="4176431" rtl="0" eaLnBrk="1" latinLnBrk="0" hangingPunct="1">
+      <a:lvl7pPr marL="13570737" indent="-1043902" algn="l" defTabSz="4175613" rtl="0" eaLnBrk="1" latinLnBrk="0" hangingPunct="1">
         <a:spcBef>
           <a:spcPct val="20000"/>
         </a:spcBef>
@@ -2912,7 +2915,7 @@
           <a:cs typeface="+mn-cs"/>
         </a:defRPr>
       </a:lvl7pPr>
-      <a:lvl8pPr marL="15661615" indent="-1044108" algn="l" defTabSz="4176431" rtl="0" eaLnBrk="1" latinLnBrk="0" hangingPunct="1">
+      <a:lvl8pPr marL="15658545" indent="-1043902" algn="l" defTabSz="4175613" rtl="0" eaLnBrk="1" latinLnBrk="0" hangingPunct="1">
         <a:spcBef>
           <a:spcPct val="20000"/>
         </a:spcBef>
@@ -2927,7 +2930,7 @@
           <a:cs typeface="+mn-cs"/>
         </a:defRPr>
       </a:lvl8pPr>
-      <a:lvl9pPr marL="17749830" indent="-1044108" algn="l" defTabSz="4176431" rtl="0" eaLnBrk="1" latinLnBrk="0" hangingPunct="1">
+      <a:lvl9pPr marL="17746350" indent="-1043902" algn="l" defTabSz="4175613" rtl="0" eaLnBrk="1" latinLnBrk="0" hangingPunct="1">
         <a:spcBef>
           <a:spcPct val="20000"/>
         </a:spcBef>
@@ -2947,7 +2950,7 @@
       <a:defPPr>
         <a:defRPr lang="fr-FR"/>
       </a:defPPr>
-      <a:lvl1pPr marL="0" algn="l" defTabSz="4176431" rtl="0" eaLnBrk="1" latinLnBrk="0" hangingPunct="1">
+      <a:lvl1pPr marL="0" algn="l" defTabSz="4175613" rtl="0" eaLnBrk="1" latinLnBrk="0" hangingPunct="1">
         <a:defRPr sz="8200" kern="1200">
           <a:solidFill>
             <a:schemeClr val="tx1"/>
@@ -2957,7 +2960,7 @@
           <a:cs typeface="+mn-cs"/>
         </a:defRPr>
       </a:lvl1pPr>
-      <a:lvl2pPr marL="2088215" algn="l" defTabSz="4176431" rtl="0" eaLnBrk="1" latinLnBrk="0" hangingPunct="1">
+      <a:lvl2pPr marL="2087804" algn="l" defTabSz="4175613" rtl="0" eaLnBrk="1" latinLnBrk="0" hangingPunct="1">
         <a:defRPr sz="8200" kern="1200">
           <a:solidFill>
             <a:schemeClr val="tx1"/>
@@ -2967,7 +2970,7 @@
           <a:cs typeface="+mn-cs"/>
         </a:defRPr>
       </a:lvl2pPr>
-      <a:lvl3pPr marL="4176431" algn="l" defTabSz="4176431" rtl="0" eaLnBrk="1" latinLnBrk="0" hangingPunct="1">
+      <a:lvl3pPr marL="4175613" algn="l" defTabSz="4175613" rtl="0" eaLnBrk="1" latinLnBrk="0" hangingPunct="1">
         <a:defRPr sz="8200" kern="1200">
           <a:solidFill>
             <a:schemeClr val="tx1"/>
@@ -2977,7 +2980,7 @@
           <a:cs typeface="+mn-cs"/>
         </a:defRPr>
       </a:lvl3pPr>
-      <a:lvl4pPr marL="6264646" algn="l" defTabSz="4176431" rtl="0" eaLnBrk="1" latinLnBrk="0" hangingPunct="1">
+      <a:lvl4pPr marL="6263417" algn="l" defTabSz="4175613" rtl="0" eaLnBrk="1" latinLnBrk="0" hangingPunct="1">
         <a:defRPr sz="8200" kern="1200">
           <a:solidFill>
             <a:schemeClr val="tx1"/>
@@ -2987,7 +2990,7 @@
           <a:cs typeface="+mn-cs"/>
         </a:defRPr>
       </a:lvl4pPr>
-      <a:lvl5pPr marL="8352861" algn="l" defTabSz="4176431" rtl="0" eaLnBrk="1" latinLnBrk="0" hangingPunct="1">
+      <a:lvl5pPr marL="8351221" algn="l" defTabSz="4175613" rtl="0" eaLnBrk="1" latinLnBrk="0" hangingPunct="1">
         <a:defRPr sz="8200" kern="1200">
           <a:solidFill>
             <a:schemeClr val="tx1"/>
@@ -2997,7 +3000,7 @@
           <a:cs typeface="+mn-cs"/>
         </a:defRPr>
       </a:lvl5pPr>
-      <a:lvl6pPr marL="10441076" algn="l" defTabSz="4176431" rtl="0" eaLnBrk="1" latinLnBrk="0" hangingPunct="1">
+      <a:lvl6pPr marL="10439030" algn="l" defTabSz="4175613" rtl="0" eaLnBrk="1" latinLnBrk="0" hangingPunct="1">
         <a:defRPr sz="8200" kern="1200">
           <a:solidFill>
             <a:schemeClr val="tx1"/>
@@ -3007,7 +3010,7 @@
           <a:cs typeface="+mn-cs"/>
         </a:defRPr>
       </a:lvl6pPr>
-      <a:lvl7pPr marL="12529292" algn="l" defTabSz="4176431" rtl="0" eaLnBrk="1" latinLnBrk="0" hangingPunct="1">
+      <a:lvl7pPr marL="12526834" algn="l" defTabSz="4175613" rtl="0" eaLnBrk="1" latinLnBrk="0" hangingPunct="1">
         <a:defRPr sz="8200" kern="1200">
           <a:solidFill>
             <a:schemeClr val="tx1"/>
@@ -3017,7 +3020,7 @@
           <a:cs typeface="+mn-cs"/>
         </a:defRPr>
       </a:lvl7pPr>
-      <a:lvl8pPr marL="14617507" algn="l" defTabSz="4176431" rtl="0" eaLnBrk="1" latinLnBrk="0" hangingPunct="1">
+      <a:lvl8pPr marL="14614639" algn="l" defTabSz="4175613" rtl="0" eaLnBrk="1" latinLnBrk="0" hangingPunct="1">
         <a:defRPr sz="8200" kern="1200">
           <a:solidFill>
             <a:schemeClr val="tx1"/>
@@ -3027,7 +3030,7 @@
           <a:cs typeface="+mn-cs"/>
         </a:defRPr>
       </a:lvl8pPr>
-      <a:lvl9pPr marL="16705722" algn="l" defTabSz="4176431" rtl="0" eaLnBrk="1" latinLnBrk="0" hangingPunct="1">
+      <a:lvl9pPr marL="16702447" algn="l" defTabSz="4175613" rtl="0" eaLnBrk="1" latinLnBrk="0" hangingPunct="1">
         <a:defRPr sz="8200" kern="1200">
           <a:solidFill>
             <a:schemeClr val="tx1"/>
@@ -3059,77 +3062,424 @@
           <a:chExt cx="0" cy="0"/>
         </a:xfrm>
       </p:grpSpPr>
-      <p:sp>
-        <p:nvSpPr>
-          <p:cNvPr id="2" name="Titre 1"/>
-          <p:cNvSpPr>
-            <a:spLocks noGrp="1"/>
-          </p:cNvSpPr>
-          <p:nvPr>
-            <p:ph type="ctrTitle"/>
-          </p:nvPr>
-        </p:nvSpPr>
-        <p:spPr/>
-        <p:txBody>
-          <a:bodyPr/>
-          <a:lstStyle/>
-          <a:p>
-            <a:endParaRPr lang="fr-FR"/>
-          </a:p>
-        </p:txBody>
-      </p:sp>
-      <p:sp>
-        <p:nvSpPr>
-          <p:cNvPr id="3" name="Sous-titre 2"/>
-          <p:cNvSpPr>
-            <a:spLocks noGrp="1"/>
-          </p:cNvSpPr>
-          <p:nvPr>
-            <p:ph type="subTitle" idx="1"/>
-          </p:nvPr>
-        </p:nvSpPr>
-        <p:spPr/>
-        <p:txBody>
-          <a:bodyPr/>
-          <a:lstStyle/>
-          <a:p>
-            <a:endParaRPr lang="fr-FR"/>
-          </a:p>
-        </p:txBody>
-      </p:sp>
-      <p:sp>
-        <p:nvSpPr>
-          <p:cNvPr id="4" name="Rectangle 3"/>
+      <p:cxnSp>
+        <p:nvCxnSpPr>
+          <p:cNvPr id="53" name="Connecteur droit 52"/>
+          <p:cNvCxnSpPr/>
+          <p:nvPr/>
+        </p:nvCxnSpPr>
+        <p:spPr>
+          <a:xfrm>
+            <a:off x="-76307" y="21902740"/>
+            <a:ext cx="31146968" cy="1588"/>
+          </a:xfrm>
+          <a:prstGeom prst="line">
+            <a:avLst/>
+          </a:prstGeom>
+          <a:ln w="254000">
+            <a:solidFill>
+              <a:srgbClr val="07578A"/>
+            </a:solidFill>
+          </a:ln>
+          <a:effectLst>
+            <a:outerShdw blurRad="50800" dist="76200" dir="5400000" algn="t" rotWithShape="0">
+              <a:prstClr val="black">
+                <a:alpha val="40000"/>
+              </a:prstClr>
+            </a:outerShdw>
+          </a:effectLst>
+        </p:spPr>
+        <p:style>
+          <a:lnRef idx="1">
+            <a:schemeClr val="accent1"/>
+          </a:lnRef>
+          <a:fillRef idx="0">
+            <a:schemeClr val="accent1"/>
+          </a:fillRef>
+          <a:effectRef idx="0">
+            <a:schemeClr val="accent1"/>
+          </a:effectRef>
+          <a:fontRef idx="minor">
+            <a:schemeClr val="tx1"/>
+          </a:fontRef>
+        </p:style>
+      </p:cxnSp>
+      <p:cxnSp>
+        <p:nvCxnSpPr>
+          <p:cNvPr id="52" name="Connecteur droit 51"/>
+          <p:cNvCxnSpPr/>
+          <p:nvPr/>
+        </p:nvCxnSpPr>
+        <p:spPr>
+          <a:xfrm>
+            <a:off x="-76307" y="21404262"/>
+            <a:ext cx="30356282" cy="1588"/>
+          </a:xfrm>
+          <a:prstGeom prst="line">
+            <a:avLst/>
+          </a:prstGeom>
+          <a:ln w="152400">
+            <a:solidFill>
+              <a:srgbClr val="07578A"/>
+            </a:solidFill>
+          </a:ln>
+          <a:effectLst>
+            <a:outerShdw blurRad="50800" dist="63500" dir="5400000" algn="t" rotWithShape="0">
+              <a:prstClr val="black">
+                <a:alpha val="40000"/>
+              </a:prstClr>
+            </a:outerShdw>
+          </a:effectLst>
+        </p:spPr>
+        <p:style>
+          <a:lnRef idx="1">
+            <a:schemeClr val="accent1"/>
+          </a:lnRef>
+          <a:fillRef idx="0">
+            <a:schemeClr val="accent1"/>
+          </a:fillRef>
+          <a:effectRef idx="0">
+            <a:schemeClr val="accent1"/>
+          </a:effectRef>
+          <a:fontRef idx="minor">
+            <a:schemeClr val="tx1"/>
+          </a:fontRef>
+        </p:style>
+      </p:cxnSp>
+      <p:cxnSp>
+        <p:nvCxnSpPr>
+          <p:cNvPr id="45" name="Connecteur droit 44"/>
+          <p:cNvCxnSpPr/>
+          <p:nvPr/>
+        </p:nvCxnSpPr>
+        <p:spPr>
+          <a:xfrm>
+            <a:off x="0" y="21047072"/>
+            <a:ext cx="30279975" cy="1588"/>
+          </a:xfrm>
+          <a:prstGeom prst="line">
+            <a:avLst/>
+          </a:prstGeom>
+          <a:ln w="114300">
+            <a:solidFill>
+              <a:srgbClr val="07578A"/>
+            </a:solidFill>
+          </a:ln>
+          <a:effectLst>
+            <a:outerShdw blurRad="50800" dist="76200" dir="5400000" algn="t" rotWithShape="0">
+              <a:prstClr val="black">
+                <a:alpha val="40000"/>
+              </a:prstClr>
+            </a:outerShdw>
+          </a:effectLst>
+        </p:spPr>
+        <p:style>
+          <a:lnRef idx="1">
+            <a:schemeClr val="accent1"/>
+          </a:lnRef>
+          <a:fillRef idx="0">
+            <a:schemeClr val="accent1"/>
+          </a:fillRef>
+          <a:effectRef idx="0">
+            <a:schemeClr val="accent1"/>
+          </a:effectRef>
+          <a:fontRef idx="minor">
+            <a:schemeClr val="tx1"/>
+          </a:fontRef>
+        </p:style>
+      </p:cxnSp>
+      <p:sp>
+        <p:nvSpPr>
+          <p:cNvPr id="33" name="Triangle rectangle 32"/>
           <p:cNvSpPr/>
           <p:nvPr/>
         </p:nvSpPr>
         <p:spPr>
-          <a:xfrm>
-            <a:off x="-790687" y="37549250"/>
-            <a:ext cx="32289975" cy="6215106"/>
+          <a:xfrm rot="10800000">
+            <a:off x="25790799" y="0"/>
+            <a:ext cx="4489176" cy="4489176"/>
           </a:xfrm>
-          <a:prstGeom prst="rect">
+          <a:prstGeom prst="rtTriangle">
             <a:avLst/>
           </a:prstGeom>
-          <a:gradFill flip="none" rotWithShape="1">
-            <a:gsLst>
-              <a:gs pos="0">
-                <a:schemeClr val="tx2"/>
-              </a:gs>
-              <a:gs pos="39999">
-                <a:srgbClr val="85C2FF"/>
-              </a:gs>
-              <a:gs pos="70000">
-                <a:srgbClr val="C4D6EB"/>
-              </a:gs>
-              <a:gs pos="100000">
-                <a:srgbClr val="FFEBFA"/>
-              </a:gs>
-            </a:gsLst>
-            <a:lin ang="16200000" scaled="0"/>
-            <a:tileRect/>
-          </a:gradFill>
+          <a:solidFill>
+            <a:srgbClr val="07578A"/>
+          </a:solidFill>
+        </p:spPr>
+        <p:style>
+          <a:lnRef idx="2">
+            <a:schemeClr val="accent1">
+              <a:shade val="50000"/>
+            </a:schemeClr>
+          </a:lnRef>
+          <a:fillRef idx="1">
+            <a:schemeClr val="accent1"/>
+          </a:fillRef>
+          <a:effectRef idx="0">
+            <a:schemeClr val="accent1"/>
+          </a:effectRef>
+          <a:fontRef idx="minor">
+            <a:schemeClr val="lt1"/>
+          </a:fontRef>
+        </p:style>
+        <p:txBody>
+          <a:bodyPr rtlCol="0" anchor="ctr"/>
+          <a:lstStyle/>
+          <a:p>
+            <a:pPr algn="ctr"/>
+            <a:endParaRPr lang="fr-FR"/>
+          </a:p>
+        </p:txBody>
+      </p:sp>
+      <p:sp>
+        <p:nvSpPr>
+          <p:cNvPr id="34" name="Ellipse 33"/>
+          <p:cNvSpPr/>
+          <p:nvPr/>
+        </p:nvSpPr>
+        <p:spPr>
+          <a:xfrm rot="10800000">
+            <a:off x="21793245" y="0"/>
+            <a:ext cx="8486730" cy="8486730"/>
+          </a:xfrm>
+          <a:prstGeom prst="ellipse">
+            <a:avLst/>
+          </a:prstGeom>
+          <a:solidFill>
+            <a:schemeClr val="bg1"/>
+          </a:solidFill>
           <a:ln>
+            <a:solidFill>
+              <a:schemeClr val="bg1"/>
+            </a:solidFill>
+          </a:ln>
+        </p:spPr>
+        <p:style>
+          <a:lnRef idx="2">
+            <a:schemeClr val="accent1">
+              <a:shade val="50000"/>
+            </a:schemeClr>
+          </a:lnRef>
+          <a:fillRef idx="1">
+            <a:schemeClr val="accent1"/>
+          </a:fillRef>
+          <a:effectRef idx="0">
+            <a:schemeClr val="accent1"/>
+          </a:effectRef>
+          <a:fontRef idx="minor">
+            <a:schemeClr val="lt1"/>
+          </a:fontRef>
+        </p:style>
+        <p:txBody>
+          <a:bodyPr rtlCol="0" anchor="ctr"/>
+          <a:lstStyle/>
+          <a:p>
+            <a:pPr algn="ctr"/>
+            <a:endParaRPr lang="fr-FR"/>
+          </a:p>
+        </p:txBody>
+      </p:sp>
+      <p:sp>
+        <p:nvSpPr>
+          <p:cNvPr id="31" name="Triangle rectangle 30"/>
+          <p:cNvSpPr/>
+          <p:nvPr/>
+        </p:nvSpPr>
+        <p:spPr>
+          <a:xfrm rot="5400000">
+            <a:off x="0" y="0"/>
+            <a:ext cx="4489176" cy="4489176"/>
+          </a:xfrm>
+          <a:prstGeom prst="rtTriangle">
+            <a:avLst/>
+          </a:prstGeom>
+          <a:solidFill>
+            <a:srgbClr val="07578A"/>
+          </a:solidFill>
+        </p:spPr>
+        <p:style>
+          <a:lnRef idx="2">
+            <a:schemeClr val="accent1">
+              <a:shade val="50000"/>
+            </a:schemeClr>
+          </a:lnRef>
+          <a:fillRef idx="1">
+            <a:schemeClr val="accent1"/>
+          </a:fillRef>
+          <a:effectRef idx="0">
+            <a:schemeClr val="accent1"/>
+          </a:effectRef>
+          <a:fontRef idx="minor">
+            <a:schemeClr val="lt1"/>
+          </a:fontRef>
+        </p:style>
+        <p:txBody>
+          <a:bodyPr rtlCol="0" anchor="ctr"/>
+          <a:lstStyle/>
+          <a:p>
+            <a:pPr algn="ctr"/>
+            <a:endParaRPr lang="fr-FR"/>
+          </a:p>
+        </p:txBody>
+      </p:sp>
+      <p:sp>
+        <p:nvSpPr>
+          <p:cNvPr id="32" name="Ellipse 31"/>
+          <p:cNvSpPr/>
+          <p:nvPr/>
+        </p:nvSpPr>
+        <p:spPr>
+          <a:xfrm rot="5400000">
+            <a:off x="0" y="0"/>
+            <a:ext cx="8486730" cy="8486730"/>
+          </a:xfrm>
+          <a:prstGeom prst="ellipse">
+            <a:avLst/>
+          </a:prstGeom>
+          <a:solidFill>
+            <a:schemeClr val="bg1"/>
+          </a:solidFill>
+          <a:ln>
+            <a:solidFill>
+              <a:schemeClr val="bg1"/>
+            </a:solidFill>
+          </a:ln>
+        </p:spPr>
+        <p:style>
+          <a:lnRef idx="2">
+            <a:schemeClr val="accent1">
+              <a:shade val="50000"/>
+            </a:schemeClr>
+          </a:lnRef>
+          <a:fillRef idx="1">
+            <a:schemeClr val="accent1"/>
+          </a:fillRef>
+          <a:effectRef idx="0">
+            <a:schemeClr val="accent1"/>
+          </a:effectRef>
+          <a:fontRef idx="minor">
+            <a:schemeClr val="lt1"/>
+          </a:fontRef>
+        </p:style>
+        <p:txBody>
+          <a:bodyPr rtlCol="0" anchor="ctr"/>
+          <a:lstStyle/>
+          <a:p>
+            <a:pPr algn="ctr"/>
+            <a:endParaRPr lang="fr-FR"/>
+          </a:p>
+        </p:txBody>
+      </p:sp>
+      <p:sp>
+        <p:nvSpPr>
+          <p:cNvPr id="13" name="Rectangle à coins arrondis 12"/>
+          <p:cNvSpPr/>
+          <p:nvPr/>
+        </p:nvSpPr>
+        <p:spPr>
+          <a:xfrm>
+            <a:off x="14997111" y="3901952"/>
+            <a:ext cx="14430476" cy="15716360"/>
+          </a:xfrm>
+          <a:prstGeom prst="roundRect">
+            <a:avLst/>
+          </a:prstGeom>
+          <a:noFill/>
+          <a:ln w="177800">
+            <a:solidFill>
+              <a:schemeClr val="accent6"/>
+            </a:solidFill>
+          </a:ln>
+        </p:spPr>
+        <p:style>
+          <a:lnRef idx="2">
+            <a:schemeClr val="accent1">
+              <a:shade val="50000"/>
+            </a:schemeClr>
+          </a:lnRef>
+          <a:fillRef idx="1">
+            <a:schemeClr val="accent1"/>
+          </a:fillRef>
+          <a:effectRef idx="0">
+            <a:schemeClr val="accent1"/>
+          </a:effectRef>
+          <a:fontRef idx="minor">
+            <a:schemeClr val="lt1"/>
+          </a:fontRef>
+        </p:style>
+        <p:txBody>
+          <a:bodyPr rtlCol="0" anchor="ctr"/>
+          <a:lstStyle/>
+          <a:p>
+            <a:pPr algn="ctr"/>
+            <a:endParaRPr lang="fr-FR"/>
+          </a:p>
+        </p:txBody>
+      </p:sp>
+      <p:sp>
+        <p:nvSpPr>
+          <p:cNvPr id="12" name="Rectangle à coins arrondis 11"/>
+          <p:cNvSpPr/>
+          <p:nvPr/>
+        </p:nvSpPr>
+        <p:spPr>
+          <a:xfrm>
+            <a:off x="709511" y="3901952"/>
+            <a:ext cx="14287600" cy="15716360"/>
+          </a:xfrm>
+          <a:prstGeom prst="roundRect">
+            <a:avLst/>
+          </a:prstGeom>
+          <a:noFill/>
+          <a:ln w="177800">
+            <a:solidFill>
+              <a:schemeClr val="accent6"/>
+            </a:solidFill>
+          </a:ln>
+        </p:spPr>
+        <p:style>
+          <a:lnRef idx="2">
+            <a:schemeClr val="accent1">
+              <a:shade val="50000"/>
+            </a:schemeClr>
+          </a:lnRef>
+          <a:fillRef idx="1">
+            <a:schemeClr val="accent1"/>
+          </a:fillRef>
+          <a:effectRef idx="0">
+            <a:schemeClr val="accent1"/>
+          </a:effectRef>
+          <a:fontRef idx="minor">
+            <a:schemeClr val="lt1"/>
+          </a:fontRef>
+        </p:style>
+        <p:txBody>
+          <a:bodyPr rtlCol="0" anchor="ctr"/>
+          <a:lstStyle/>
+          <a:p>
+            <a:pPr algn="ctr"/>
+            <a:endParaRPr lang="fr-FR"/>
+          </a:p>
+        </p:txBody>
+      </p:sp>
+      <p:sp>
+        <p:nvSpPr>
+          <p:cNvPr id="5" name="Rectangle à coins arrondis 4"/>
+          <p:cNvSpPr/>
+          <p:nvPr/>
+        </p:nvSpPr>
+        <p:spPr>
+          <a:xfrm>
+            <a:off x="4638601" y="-3170406"/>
+            <a:ext cx="21002772" cy="7929621"/>
+          </a:xfrm>
+          <a:prstGeom prst="roundRect">
+            <a:avLst/>
+          </a:prstGeom>
+          <a:solidFill>
+            <a:srgbClr val="07578A"/>
+          </a:solidFill>
+          <a:ln w="146050" cap="rnd" cmpd="sng">
             <a:noFill/>
           </a:ln>
         </p:spPr>
@@ -3150,7 +3500,7 @@
           </a:fontRef>
         </p:style>
         <p:txBody>
-          <a:bodyPr rtlCol="0" anchor="ctr"/>
+          <a:bodyPr lIns="91421" tIns="45711" rIns="91421" bIns="45711" rtlCol="0" anchor="ctr"/>
           <a:lstStyle/>
           <a:p>
             <a:pPr algn="ctr"/>
@@ -3158,6 +3508,817 @@
           </a:p>
         </p:txBody>
       </p:sp>
+      <p:sp>
+        <p:nvSpPr>
+          <p:cNvPr id="2" name="Titre 1"/>
+          <p:cNvSpPr>
+            <a:spLocks noGrp="1"/>
+          </p:cNvSpPr>
+          <p:nvPr>
+            <p:ph type="ctrTitle"/>
+          </p:nvPr>
+        </p:nvSpPr>
+        <p:spPr>
+          <a:xfrm>
+            <a:off x="2668982" y="-312890"/>
+            <a:ext cx="24942010" cy="4105343"/>
+          </a:xfrm>
+          <a:ln>
+            <a:noFill/>
+          </a:ln>
+        </p:spPr>
+        <p:txBody>
+          <a:bodyPr/>
+          <a:lstStyle/>
+          <a:p>
+            <a:r>
+              <a:rPr lang="fr-FR" b="1" i="1" u="dbl" kern="600" cap="all" dirty="0" smtClean="0">
+                <a:solidFill>
+                  <a:schemeClr val="accent6"/>
+                </a:solidFill>
+                <a:effectLst>
+                  <a:outerShdw blurRad="38100" dist="38100" dir="2700000" algn="tl">
+                    <a:srgbClr val="000000">
+                      <a:alpha val="43137"/>
+                    </a:srgbClr>
+                  </a:outerShdw>
+                </a:effectLst>
+                <a:uFill>
+                  <a:solidFill>
+                    <a:schemeClr val="accent6"/>
+                  </a:solidFill>
+                </a:uFill>
+                <a:latin typeface="Agency FB" pitchFamily="34" charset="0"/>
+              </a:rPr>
+              <a:t>La maison du futur</a:t>
+            </a:r>
+            <a:endParaRPr lang="fr-FR" b="1" i="1" u="dbl" kern="600" cap="all" dirty="0">
+              <a:solidFill>
+                <a:schemeClr val="accent6"/>
+              </a:solidFill>
+              <a:effectLst>
+                <a:outerShdw blurRad="38100" dist="38100" dir="2700000" algn="tl">
+                  <a:srgbClr val="000000">
+                    <a:alpha val="43137"/>
+                  </a:srgbClr>
+                </a:outerShdw>
+              </a:effectLst>
+              <a:uFill>
+                <a:solidFill>
+                  <a:schemeClr val="accent6"/>
+                </a:solidFill>
+              </a:uFill>
+              <a:latin typeface="Agency FB" pitchFamily="34" charset="0"/>
+            </a:endParaRPr>
+          </a:p>
+        </p:txBody>
+      </p:sp>
+      <p:sp>
+        <p:nvSpPr>
+          <p:cNvPr id="7" name="ZoneTexte 6"/>
+          <p:cNvSpPr txBox="1"/>
+          <p:nvPr/>
+        </p:nvSpPr>
+        <p:spPr>
+          <a:xfrm>
+            <a:off x="1138139" y="4973522"/>
+            <a:ext cx="13430344" cy="12757320"/>
+          </a:xfrm>
+          <a:prstGeom prst="rect">
+            <a:avLst/>
+          </a:prstGeom>
+          <a:noFill/>
+        </p:spPr>
+        <p:txBody>
+          <a:bodyPr wrap="square" lIns="91421" tIns="45711" rIns="91421" bIns="45711" rtlCol="0">
+            <a:spAutoFit/>
+          </a:bodyPr>
+          <a:lstStyle/>
+          <a:p>
+            <a:r>
+              <a:rPr lang="fr-FR" sz="7300" dirty="0" smtClean="0">
+                <a:latin typeface="Agency FB" pitchFamily="34" charset="0"/>
+              </a:rPr>
+              <a:t>Le lycée Raymond Queneau à eu l’idée de </a:t>
+            </a:r>
+            <a:r>
+              <a:rPr lang="fr-FR" sz="7300" dirty="0" smtClean="0">
+                <a:latin typeface="Agency FB" pitchFamily="34" charset="0"/>
+              </a:rPr>
+              <a:t>proposer </a:t>
+            </a:r>
+            <a:r>
+              <a:rPr lang="fr-FR" sz="7300" dirty="0" smtClean="0">
+                <a:latin typeface="Agency FB" pitchFamily="34" charset="0"/>
+              </a:rPr>
+              <a:t>le projet « la maison du futur » afin de mettre en valeur la formation du BTS Système Numérique. Ce projet consiste à </a:t>
+            </a:r>
+            <a:r>
+              <a:rPr lang="fr-FR" sz="7300" b="1" dirty="0" smtClean="0">
+                <a:solidFill>
+                  <a:srgbClr val="07578A"/>
+                </a:solidFill>
+                <a:latin typeface="Agency FB" pitchFamily="34" charset="0"/>
+              </a:rPr>
+              <a:t>connecter</a:t>
+            </a:r>
+            <a:r>
+              <a:rPr lang="fr-FR" sz="7300" dirty="0" smtClean="0">
+                <a:latin typeface="Agency FB" pitchFamily="34" charset="0"/>
+              </a:rPr>
+              <a:t> </a:t>
+            </a:r>
+            <a:r>
+              <a:rPr lang="fr-FR" sz="7300" b="1" dirty="0" smtClean="0">
+                <a:solidFill>
+                  <a:srgbClr val="07578A"/>
+                </a:solidFill>
+                <a:latin typeface="Agency FB" pitchFamily="34" charset="0"/>
+              </a:rPr>
+              <a:t>une maison </a:t>
+            </a:r>
+            <a:r>
+              <a:rPr lang="fr-FR" sz="7300" dirty="0" smtClean="0">
+                <a:latin typeface="Agency FB" pitchFamily="34" charset="0"/>
+              </a:rPr>
+              <a:t>et </a:t>
+            </a:r>
+            <a:r>
+              <a:rPr lang="fr-FR" sz="7300" dirty="0" smtClean="0">
+                <a:latin typeface="Agency FB" pitchFamily="34" charset="0"/>
+              </a:rPr>
+              <a:t>tous </a:t>
+            </a:r>
+            <a:r>
+              <a:rPr lang="fr-FR" sz="7300" dirty="0" smtClean="0">
+                <a:latin typeface="Agency FB" pitchFamily="34" charset="0"/>
+              </a:rPr>
+              <a:t>ses </a:t>
+            </a:r>
+            <a:r>
+              <a:rPr lang="fr-FR" sz="7300" dirty="0" smtClean="0">
+                <a:latin typeface="Agency FB" pitchFamily="34" charset="0"/>
+              </a:rPr>
+              <a:t>capteurs</a:t>
+            </a:r>
+            <a:r>
+              <a:rPr lang="fr-FR" sz="7300" b="1" dirty="0" smtClean="0">
+                <a:solidFill>
+                  <a:srgbClr val="07578A"/>
+                </a:solidFill>
+                <a:latin typeface="Agency FB" pitchFamily="34" charset="0"/>
+              </a:rPr>
+              <a:t> </a:t>
+            </a:r>
+            <a:r>
+              <a:rPr lang="fr-FR" sz="7300" dirty="0" smtClean="0">
+                <a:latin typeface="Agency FB" pitchFamily="34" charset="0"/>
+              </a:rPr>
+              <a:t>à une </a:t>
+            </a:r>
+            <a:r>
+              <a:rPr lang="fr-FR" sz="7300" b="1" dirty="0" smtClean="0">
+                <a:solidFill>
+                  <a:srgbClr val="07578A"/>
+                </a:solidFill>
+                <a:latin typeface="Agency FB" pitchFamily="34" charset="0"/>
+              </a:rPr>
+              <a:t>application</a:t>
+            </a:r>
+            <a:r>
+              <a:rPr lang="fr-FR" sz="7300" dirty="0" smtClean="0">
+                <a:latin typeface="Agency FB" pitchFamily="34" charset="0"/>
+              </a:rPr>
+              <a:t> </a:t>
+            </a:r>
+            <a:r>
+              <a:rPr lang="fr-FR" sz="7300" dirty="0" err="1" smtClean="0">
+                <a:latin typeface="Agency FB" pitchFamily="34" charset="0"/>
+              </a:rPr>
+              <a:t>Android</a:t>
+            </a:r>
+            <a:r>
+              <a:rPr lang="fr-FR" sz="7300" dirty="0" smtClean="0">
+                <a:latin typeface="Agency FB" pitchFamily="34" charset="0"/>
+              </a:rPr>
+              <a:t> et à un </a:t>
+            </a:r>
+            <a:r>
+              <a:rPr lang="fr-FR" sz="7300" b="1" dirty="0" smtClean="0">
+                <a:solidFill>
+                  <a:srgbClr val="07578A"/>
+                </a:solidFill>
+                <a:latin typeface="Agency FB" pitchFamily="34" charset="0"/>
+              </a:rPr>
+              <a:t>serveur Web</a:t>
+            </a:r>
+            <a:r>
+              <a:rPr lang="fr-FR" sz="7300" dirty="0" smtClean="0">
+                <a:latin typeface="Agency FB" pitchFamily="34" charset="0"/>
+              </a:rPr>
+              <a:t>.</a:t>
+            </a:r>
+          </a:p>
+          <a:p>
+            <a:endParaRPr lang="fr-FR" sz="2000" dirty="0" smtClean="0">
+              <a:latin typeface="Agency FB" pitchFamily="34" charset="0"/>
+            </a:endParaRPr>
+          </a:p>
+          <a:p>
+            <a:r>
+              <a:rPr lang="fr-FR" sz="7300" dirty="0" smtClean="0">
+                <a:latin typeface="Agency FB" pitchFamily="34" charset="0"/>
+              </a:rPr>
+              <a:t>Nous pourrons alors récupérer divers </a:t>
+            </a:r>
+            <a:r>
+              <a:rPr lang="fr-FR" sz="7300" b="1" dirty="0" smtClean="0">
+                <a:solidFill>
+                  <a:srgbClr val="07578A"/>
+                </a:solidFill>
+                <a:latin typeface="Agency FB" pitchFamily="34" charset="0"/>
+              </a:rPr>
+              <a:t>informations</a:t>
+            </a:r>
+            <a:r>
+              <a:rPr lang="fr-FR" sz="7300" dirty="0" smtClean="0">
+                <a:latin typeface="Agency FB" pitchFamily="34" charset="0"/>
+              </a:rPr>
+              <a:t> issues des </a:t>
+            </a:r>
+            <a:r>
+              <a:rPr lang="fr-FR" sz="7300" b="1" dirty="0" smtClean="0">
+                <a:solidFill>
+                  <a:srgbClr val="07578A"/>
+                </a:solidFill>
+                <a:latin typeface="Agency FB" pitchFamily="34" charset="0"/>
+              </a:rPr>
+              <a:t>capteurs</a:t>
+            </a:r>
+            <a:r>
+              <a:rPr lang="fr-FR" sz="7300" dirty="0" smtClean="0">
+                <a:latin typeface="Agency FB" pitchFamily="34" charset="0"/>
+              </a:rPr>
+              <a:t> et gérer différents </a:t>
+            </a:r>
+            <a:r>
+              <a:rPr lang="fr-FR" sz="7300" b="1" dirty="0" smtClean="0">
+                <a:solidFill>
+                  <a:srgbClr val="07578A"/>
+                </a:solidFill>
+                <a:latin typeface="Agency FB" pitchFamily="34" charset="0"/>
+              </a:rPr>
+              <a:t>actionneurs</a:t>
+            </a:r>
+            <a:r>
+              <a:rPr lang="fr-FR" sz="7300" dirty="0" smtClean="0">
+                <a:latin typeface="Agency FB" pitchFamily="34" charset="0"/>
+              </a:rPr>
+              <a:t>. Un </a:t>
+            </a:r>
+            <a:r>
+              <a:rPr lang="fr-FR" sz="7300" b="1" dirty="0" smtClean="0">
+                <a:solidFill>
+                  <a:srgbClr val="07578A"/>
+                </a:solidFill>
+                <a:latin typeface="Agency FB" pitchFamily="34" charset="0"/>
+              </a:rPr>
+              <a:t>système de sécurité</a:t>
+            </a:r>
+            <a:r>
+              <a:rPr lang="fr-FR" sz="7300" dirty="0" smtClean="0">
+                <a:latin typeface="Agency FB" pitchFamily="34" charset="0"/>
+              </a:rPr>
+              <a:t> équipera également la maison.</a:t>
+            </a:r>
+            <a:endParaRPr lang="fr-FR" sz="7300" dirty="0">
+              <a:latin typeface="Agency FB" pitchFamily="34" charset="0"/>
+            </a:endParaRPr>
+          </a:p>
+        </p:txBody>
+      </p:sp>
+      <p:sp>
+        <p:nvSpPr>
+          <p:cNvPr id="8" name="ZoneTexte 7"/>
+          <p:cNvSpPr txBox="1"/>
+          <p:nvPr/>
+        </p:nvSpPr>
+        <p:spPr>
+          <a:xfrm>
+            <a:off x="15925805" y="5545026"/>
+            <a:ext cx="13430344" cy="10941439"/>
+          </a:xfrm>
+          <a:prstGeom prst="rect">
+            <a:avLst/>
+          </a:prstGeom>
+          <a:noFill/>
+        </p:spPr>
+        <p:txBody>
+          <a:bodyPr wrap="square" lIns="91421" tIns="45711" rIns="91421" bIns="45711" rtlCol="0">
+            <a:spAutoFit/>
+          </a:bodyPr>
+          <a:lstStyle/>
+          <a:p>
+            <a:r>
+              <a:rPr lang="en-US" sz="7300" dirty="0" smtClean="0">
+                <a:latin typeface="Agency FB" pitchFamily="34" charset="0"/>
+              </a:rPr>
+              <a:t>The Raymond </a:t>
+            </a:r>
+            <a:r>
+              <a:rPr lang="en-US" sz="7300" dirty="0" err="1" smtClean="0">
+                <a:latin typeface="Agency FB" pitchFamily="34" charset="0"/>
+              </a:rPr>
+              <a:t>Queneau</a:t>
+            </a:r>
+            <a:r>
+              <a:rPr lang="en-US" sz="7300" dirty="0" smtClean="0">
+                <a:latin typeface="Agency FB" pitchFamily="34" charset="0"/>
+              </a:rPr>
+              <a:t> high school had to  think about a project to put on forward the BTS Numeric System so here is the project « House of future ». This </a:t>
+            </a:r>
+            <a:r>
+              <a:rPr lang="en-US" sz="7300" dirty="0" smtClean="0">
+                <a:latin typeface="Agency FB" pitchFamily="34" charset="0"/>
+              </a:rPr>
+              <a:t>project consist to </a:t>
+            </a:r>
+            <a:r>
+              <a:rPr lang="en-US" sz="7300" b="1" dirty="0" smtClean="0">
+                <a:solidFill>
+                  <a:srgbClr val="07578A"/>
+                </a:solidFill>
+                <a:latin typeface="Agency FB" pitchFamily="34" charset="0"/>
+              </a:rPr>
+              <a:t>connect a house </a:t>
+            </a:r>
+            <a:r>
+              <a:rPr lang="en-US" sz="7300" dirty="0" smtClean="0">
+                <a:latin typeface="Agency FB" pitchFamily="34" charset="0"/>
+              </a:rPr>
+              <a:t>and all his sensors to an Android </a:t>
+            </a:r>
+            <a:r>
+              <a:rPr lang="en-US" sz="7300" b="1" dirty="0" smtClean="0">
+                <a:solidFill>
+                  <a:srgbClr val="07578A"/>
+                </a:solidFill>
+                <a:latin typeface="Agency FB" pitchFamily="34" charset="0"/>
+              </a:rPr>
+              <a:t>application</a:t>
+            </a:r>
+            <a:r>
+              <a:rPr lang="en-US" sz="7300" dirty="0" smtClean="0">
+                <a:latin typeface="Agency FB" pitchFamily="34" charset="0"/>
+              </a:rPr>
+              <a:t> and a </a:t>
+            </a:r>
+            <a:r>
+              <a:rPr lang="en-US" sz="7300" b="1" dirty="0" smtClean="0">
+                <a:solidFill>
+                  <a:srgbClr val="07578A"/>
+                </a:solidFill>
+                <a:latin typeface="Agency FB" pitchFamily="34" charset="0"/>
+              </a:rPr>
+              <a:t>Web </a:t>
+            </a:r>
+            <a:r>
+              <a:rPr lang="en-US" sz="7300" b="1" dirty="0" smtClean="0">
+                <a:solidFill>
+                  <a:srgbClr val="07578A"/>
+                </a:solidFill>
+                <a:latin typeface="Agency FB" pitchFamily="34" charset="0"/>
+              </a:rPr>
+              <a:t>server</a:t>
+            </a:r>
+            <a:r>
+              <a:rPr lang="en-US" sz="7300" dirty="0" smtClean="0">
+                <a:latin typeface="Agency FB" pitchFamily="34" charset="0"/>
+              </a:rPr>
+              <a:t>. </a:t>
+            </a:r>
+          </a:p>
+          <a:p>
+            <a:endParaRPr lang="en-US" sz="4800" dirty="0" smtClean="0">
+              <a:latin typeface="Agency FB" pitchFamily="34" charset="0"/>
+            </a:endParaRPr>
+          </a:p>
+          <a:p>
+            <a:r>
+              <a:rPr lang="en-US" sz="7300" dirty="0" smtClean="0">
+                <a:latin typeface="Agency FB" pitchFamily="34" charset="0"/>
+              </a:rPr>
+              <a:t>So, we could get various </a:t>
+            </a:r>
+            <a:r>
+              <a:rPr lang="en-US" sz="7300" b="1" dirty="0" smtClean="0">
+                <a:solidFill>
+                  <a:srgbClr val="07578A"/>
+                </a:solidFill>
+                <a:latin typeface="Agency FB" pitchFamily="34" charset="0"/>
+              </a:rPr>
+              <a:t>information</a:t>
+            </a:r>
+            <a:r>
+              <a:rPr lang="en-US" sz="7300" dirty="0" smtClean="0">
+                <a:latin typeface="Agency FB" pitchFamily="34" charset="0"/>
+              </a:rPr>
+              <a:t> from the </a:t>
+            </a:r>
+            <a:r>
+              <a:rPr lang="en-US" sz="7300" b="1" dirty="0" smtClean="0">
+                <a:solidFill>
+                  <a:srgbClr val="07578A"/>
+                </a:solidFill>
+                <a:latin typeface="Agency FB" pitchFamily="34" charset="0"/>
+              </a:rPr>
+              <a:t>sensors</a:t>
+            </a:r>
+            <a:r>
+              <a:rPr lang="en-US" sz="7300" dirty="0" smtClean="0">
+                <a:latin typeface="Agency FB" pitchFamily="34" charset="0"/>
+              </a:rPr>
+              <a:t> and handle different </a:t>
+            </a:r>
+            <a:r>
+              <a:rPr lang="en-US" sz="7300" b="1" dirty="0" smtClean="0">
+                <a:solidFill>
+                  <a:srgbClr val="07578A"/>
+                </a:solidFill>
+                <a:latin typeface="Agency FB" pitchFamily="34" charset="0"/>
+              </a:rPr>
+              <a:t>actuators</a:t>
+            </a:r>
+            <a:r>
+              <a:rPr lang="en-US" sz="7300" dirty="0" smtClean="0">
+                <a:latin typeface="Agency FB" pitchFamily="34" charset="0"/>
+              </a:rPr>
+              <a:t>. A </a:t>
+            </a:r>
+            <a:r>
+              <a:rPr lang="en-US" sz="7300" b="1" dirty="0" smtClean="0">
+                <a:solidFill>
+                  <a:srgbClr val="07578A"/>
+                </a:solidFill>
+                <a:latin typeface="Agency FB" pitchFamily="34" charset="0"/>
+              </a:rPr>
+              <a:t>security system </a:t>
+            </a:r>
+            <a:r>
+              <a:rPr lang="en-US" sz="7300" dirty="0" smtClean="0">
+                <a:latin typeface="Agency FB" pitchFamily="34" charset="0"/>
+              </a:rPr>
+              <a:t>will also equip the house.</a:t>
+            </a:r>
+            <a:endParaRPr lang="en-US" sz="7300" dirty="0"/>
+          </a:p>
+        </p:txBody>
+      </p:sp>
+      <p:sp>
+        <p:nvSpPr>
+          <p:cNvPr id="19" name="Triangle rectangle 18"/>
+          <p:cNvSpPr/>
+          <p:nvPr/>
+        </p:nvSpPr>
+        <p:spPr>
+          <a:xfrm>
+            <a:off x="0" y="34169396"/>
+            <a:ext cx="8639129" cy="8639129"/>
+          </a:xfrm>
+          <a:prstGeom prst="rtTriangle">
+            <a:avLst/>
+          </a:prstGeom>
+          <a:solidFill>
+            <a:srgbClr val="07578A"/>
+          </a:solidFill>
+          <a:effectLst/>
+        </p:spPr>
+        <p:style>
+          <a:lnRef idx="2">
+            <a:schemeClr val="accent1">
+              <a:shade val="50000"/>
+            </a:schemeClr>
+          </a:lnRef>
+          <a:fillRef idx="1">
+            <a:schemeClr val="accent1"/>
+          </a:fillRef>
+          <a:effectRef idx="0">
+            <a:schemeClr val="accent1"/>
+          </a:effectRef>
+          <a:fontRef idx="minor">
+            <a:schemeClr val="lt1"/>
+          </a:fontRef>
+        </p:style>
+        <p:txBody>
+          <a:bodyPr rtlCol="0" anchor="ctr"/>
+          <a:lstStyle/>
+          <a:p>
+            <a:pPr algn="ctr"/>
+            <a:endParaRPr lang="fr-FR"/>
+          </a:p>
+        </p:txBody>
+      </p:sp>
+      <p:sp>
+        <p:nvSpPr>
+          <p:cNvPr id="22" name="Triangle rectangle 21"/>
+          <p:cNvSpPr/>
+          <p:nvPr/>
+        </p:nvSpPr>
+        <p:spPr>
+          <a:xfrm rot="16200000">
+            <a:off x="21640846" y="34169396"/>
+            <a:ext cx="8639129" cy="8639129"/>
+          </a:xfrm>
+          <a:prstGeom prst="rtTriangle">
+            <a:avLst/>
+          </a:prstGeom>
+          <a:solidFill>
+            <a:srgbClr val="07578A"/>
+          </a:solidFill>
+        </p:spPr>
+        <p:style>
+          <a:lnRef idx="2">
+            <a:schemeClr val="accent1">
+              <a:shade val="50000"/>
+            </a:schemeClr>
+          </a:lnRef>
+          <a:fillRef idx="1">
+            <a:schemeClr val="accent1"/>
+          </a:fillRef>
+          <a:effectRef idx="0">
+            <a:schemeClr val="accent1"/>
+          </a:effectRef>
+          <a:fontRef idx="minor">
+            <a:schemeClr val="lt1"/>
+          </a:fontRef>
+        </p:style>
+        <p:txBody>
+          <a:bodyPr rtlCol="0" anchor="ctr"/>
+          <a:lstStyle/>
+          <a:p>
+            <a:pPr algn="ctr"/>
+            <a:endParaRPr lang="fr-FR"/>
+          </a:p>
+        </p:txBody>
+      </p:sp>
+      <p:sp>
+        <p:nvSpPr>
+          <p:cNvPr id="23" name="Ellipse 22"/>
+          <p:cNvSpPr/>
+          <p:nvPr/>
+        </p:nvSpPr>
+        <p:spPr>
+          <a:xfrm>
+            <a:off x="-1" y="26432059"/>
+            <a:ext cx="16332165" cy="16332165"/>
+          </a:xfrm>
+          <a:prstGeom prst="ellipse">
+            <a:avLst/>
+          </a:prstGeom>
+          <a:solidFill>
+            <a:schemeClr val="bg1"/>
+          </a:solidFill>
+          <a:ln>
+            <a:solidFill>
+              <a:schemeClr val="bg1"/>
+            </a:solidFill>
+          </a:ln>
+          <a:effectLst/>
+        </p:spPr>
+        <p:style>
+          <a:lnRef idx="2">
+            <a:schemeClr val="accent1">
+              <a:shade val="50000"/>
+            </a:schemeClr>
+          </a:lnRef>
+          <a:fillRef idx="1">
+            <a:schemeClr val="accent1"/>
+          </a:fillRef>
+          <a:effectRef idx="0">
+            <a:schemeClr val="accent1"/>
+          </a:effectRef>
+          <a:fontRef idx="minor">
+            <a:schemeClr val="lt1"/>
+          </a:fontRef>
+        </p:style>
+        <p:txBody>
+          <a:bodyPr rtlCol="0" anchor="ctr"/>
+          <a:lstStyle/>
+          <a:p>
+            <a:pPr algn="ctr"/>
+            <a:endParaRPr lang="fr-FR"/>
+          </a:p>
+        </p:txBody>
+      </p:sp>
+      <p:sp>
+        <p:nvSpPr>
+          <p:cNvPr id="24" name="Ellipse 23"/>
+          <p:cNvSpPr/>
+          <p:nvPr/>
+        </p:nvSpPr>
+        <p:spPr>
+          <a:xfrm>
+            <a:off x="13947810" y="26432059"/>
+            <a:ext cx="16332165" cy="16332165"/>
+          </a:xfrm>
+          <a:prstGeom prst="ellipse">
+            <a:avLst/>
+          </a:prstGeom>
+          <a:solidFill>
+            <a:schemeClr val="bg1"/>
+          </a:solidFill>
+          <a:ln>
+            <a:solidFill>
+              <a:schemeClr val="bg1"/>
+            </a:solidFill>
+          </a:ln>
+        </p:spPr>
+        <p:style>
+          <a:lnRef idx="2">
+            <a:schemeClr val="accent1">
+              <a:shade val="50000"/>
+            </a:schemeClr>
+          </a:lnRef>
+          <a:fillRef idx="1">
+            <a:schemeClr val="accent1"/>
+          </a:fillRef>
+          <a:effectRef idx="0">
+            <a:schemeClr val="accent1"/>
+          </a:effectRef>
+          <a:fontRef idx="minor">
+            <a:schemeClr val="lt1"/>
+          </a:fontRef>
+        </p:style>
+        <p:txBody>
+          <a:bodyPr rtlCol="0" anchor="ctr"/>
+          <a:lstStyle/>
+          <a:p>
+            <a:pPr algn="ctr"/>
+            <a:endParaRPr lang="fr-FR"/>
+          </a:p>
+        </p:txBody>
+      </p:sp>
+      <p:pic>
+        <p:nvPicPr>
+          <p:cNvPr id="1035" name="Picture 11" descr="Q:\domotique\Architecture_materielV3.png"/>
+          <p:cNvPicPr>
+            <a:picLocks noChangeAspect="1" noChangeArrowheads="1"/>
+          </p:cNvPicPr>
+          <p:nvPr/>
+        </p:nvPicPr>
+        <p:blipFill>
+          <a:blip r:embed="rId2"/>
+          <a:srcRect/>
+          <a:stretch>
+            <a:fillRect/>
+          </a:stretch>
+        </p:blipFill>
+        <p:spPr bwMode="auto">
+          <a:xfrm>
+            <a:off x="1920875" y="24254518"/>
+            <a:ext cx="26438224" cy="14723492"/>
+          </a:xfrm>
+          <a:prstGeom prst="rect">
+            <a:avLst/>
+          </a:prstGeom>
+          <a:noFill/>
+        </p:spPr>
+      </p:pic>
+      <p:sp>
+        <p:nvSpPr>
+          <p:cNvPr id="27" name="Rectangle à coins arrondis 26"/>
+          <p:cNvSpPr/>
+          <p:nvPr/>
+        </p:nvSpPr>
+        <p:spPr>
+          <a:xfrm>
+            <a:off x="1388172" y="22975898"/>
+            <a:ext cx="27503630" cy="16144988"/>
+          </a:xfrm>
+          <a:prstGeom prst="roundRect">
+            <a:avLst/>
+          </a:prstGeom>
+          <a:noFill/>
+          <a:ln w="177800">
+            <a:solidFill>
+              <a:schemeClr val="accent6"/>
+            </a:solidFill>
+          </a:ln>
+        </p:spPr>
+        <p:style>
+          <a:lnRef idx="2">
+            <a:schemeClr val="accent1">
+              <a:shade val="50000"/>
+            </a:schemeClr>
+          </a:lnRef>
+          <a:fillRef idx="1">
+            <a:schemeClr val="accent1"/>
+          </a:fillRef>
+          <a:effectRef idx="0">
+            <a:schemeClr val="accent1"/>
+          </a:effectRef>
+          <a:fontRef idx="minor">
+            <a:schemeClr val="lt1"/>
+          </a:fontRef>
+        </p:style>
+        <p:txBody>
+          <a:bodyPr rtlCol="0" anchor="ctr"/>
+          <a:lstStyle/>
+          <a:p>
+            <a:pPr algn="ctr"/>
+            <a:endParaRPr lang="fr-FR" dirty="0"/>
+          </a:p>
+        </p:txBody>
+      </p:sp>
+      <p:sp>
+        <p:nvSpPr>
+          <p:cNvPr id="26" name="ZoneTexte 25"/>
+          <p:cNvSpPr txBox="1"/>
+          <p:nvPr/>
+        </p:nvSpPr>
+        <p:spPr>
+          <a:xfrm>
+            <a:off x="5960204" y="39923927"/>
+            <a:ext cx="18359566" cy="2554545"/>
+          </a:xfrm>
+          <a:prstGeom prst="rect">
+            <a:avLst/>
+          </a:prstGeom>
+          <a:noFill/>
+        </p:spPr>
+        <p:txBody>
+          <a:bodyPr wrap="square" rtlCol="0">
+            <a:spAutoFit/>
+          </a:bodyPr>
+          <a:lstStyle/>
+          <a:p>
+            <a:pPr algn="ctr"/>
+            <a:r>
+              <a:rPr lang="fr-FR" sz="8000" dirty="0" smtClean="0">
+                <a:solidFill>
+                  <a:srgbClr val="07578A"/>
+                </a:solidFill>
+                <a:latin typeface="Agency FB" pitchFamily="34" charset="0"/>
+              </a:rPr>
+              <a:t>     GUYADER Benjamin | CHAUVEAU </a:t>
+            </a:r>
+            <a:r>
+              <a:rPr lang="fr-FR" sz="8000" dirty="0" smtClean="0">
+                <a:solidFill>
+                  <a:srgbClr val="07578A"/>
+                </a:solidFill>
+                <a:latin typeface="Agency FB" pitchFamily="34" charset="0"/>
+              </a:rPr>
+              <a:t>Aurélien </a:t>
+            </a:r>
+          </a:p>
+          <a:p>
+            <a:pPr algn="ctr"/>
+            <a:r>
+              <a:rPr lang="fr-FR" sz="8000" dirty="0" smtClean="0">
+                <a:solidFill>
+                  <a:srgbClr val="07578A"/>
+                </a:solidFill>
+                <a:latin typeface="Agency FB" pitchFamily="34" charset="0"/>
+              </a:rPr>
+              <a:t>DUFRESNE Nicolas | GIRARD Tommy</a:t>
+            </a:r>
+            <a:endParaRPr lang="fr-FR" sz="8000" dirty="0">
+              <a:solidFill>
+                <a:srgbClr val="07578A"/>
+              </a:solidFill>
+              <a:latin typeface="Agency FB" pitchFamily="34" charset="0"/>
+            </a:endParaRPr>
+          </a:p>
+        </p:txBody>
+      </p:sp>
+      <p:pic>
+        <p:nvPicPr>
+          <p:cNvPr id="1026" name="Picture 2" descr="Q:\Projet_Domotique_GITBTS\Logiciels\img\LOGO_domotique_App.png"/>
+          <p:cNvPicPr>
+            <a:picLocks noChangeAspect="1" noChangeArrowheads="1"/>
+          </p:cNvPicPr>
+          <p:nvPr/>
+        </p:nvPicPr>
+        <p:blipFill>
+          <a:blip r:embed="rId3"/>
+          <a:srcRect/>
+          <a:stretch>
+            <a:fillRect/>
+          </a:stretch>
+        </p:blipFill>
+        <p:spPr bwMode="auto">
+          <a:xfrm>
+            <a:off x="9067758" y="16403602"/>
+            <a:ext cx="12144459" cy="12144463"/>
+          </a:xfrm>
+          <a:prstGeom prst="rect">
+            <a:avLst/>
+          </a:prstGeom>
+          <a:noFill/>
+          <a:effectLst/>
+        </p:spPr>
+      </p:pic>
     </p:spTree>
   </p:cSld>
   <p:clrMapOvr>

</xml_diff>